<commit_message>
add acdnet reading note files
</commit_message>
<xml_diff>
--- a/Researches/ReadingNotes/Paper_Reading_PPT_Template.pptx
+++ b/Researches/ReadingNotes/Paper_Reading_PPT_Template.pptx
@@ -105,6 +105,11 @@
       </a:defRPr>
     </a:lvl9pPr>
   </p:defaultTextStyle>
+  <p:extLst>
+    <p:ext uri="{EFAFB233-063F-42B5-8137-9DF3F51BA10A}">
+      <p15:sldGuideLst xmlns:p15="http://schemas.microsoft.com/office/powerpoint/2012/main"/>
+    </p:ext>
+  </p:extLst>
 </p:presentation>
 </file>
 
@@ -154,7 +159,7 @@
           <a:lstStyle>
             <a:lvl1pPr algn="ctr">
               <a:defRPr sz="4800" b="0" i="0">
-                <a:latin typeface="Kaiti SC" panose="02010600040101010101" pitchFamily="2" charset="-122"/>
+                <a:latin typeface="+mn-lt"/>
                 <a:ea typeface="Kaiti SC" panose="02010600040101010101" pitchFamily="2" charset="-122"/>
               </a:defRPr>
             </a:lvl1pPr>
@@ -195,7 +200,7 @@
             <a:lvl1pPr marL="0" indent="0" algn="ctr">
               <a:buNone/>
               <a:defRPr sz="2400" b="0" i="0">
-                <a:latin typeface="Kaiti SC" panose="02010600040101010101" pitchFamily="2" charset="-122"/>
+                <a:latin typeface="+mn-lt"/>
                 <a:ea typeface="Kaiti SC" panose="02010600040101010101" pitchFamily="2" charset="-122"/>
               </a:defRPr>
             </a:lvl1pPr>
@@ -788,7 +793,7 @@
           <a:lstStyle>
             <a:lvl1pPr>
               <a:defRPr sz="3200" b="0" i="0">
-                <a:latin typeface="Kaiti SC" panose="02010600040101010101" pitchFamily="2" charset="-122"/>
+                <a:latin typeface="+mn-lt"/>
                 <a:ea typeface="Kaiti SC" panose="02010600040101010101" pitchFamily="2" charset="-122"/>
               </a:defRPr>
             </a:lvl1pPr>
@@ -828,31 +833,31 @@
           <a:lstStyle>
             <a:lvl1pPr>
               <a:defRPr sz="2400" b="0" i="0">
-                <a:latin typeface="Kaiti SC" panose="02010600040101010101" pitchFamily="2" charset="-122"/>
+                <a:latin typeface="+mn-lt"/>
                 <a:ea typeface="Kaiti SC" panose="02010600040101010101" pitchFamily="2" charset="-122"/>
               </a:defRPr>
             </a:lvl1pPr>
             <a:lvl2pPr>
               <a:defRPr sz="2200" b="0" i="0">
-                <a:latin typeface="Kaiti SC" panose="02010600040101010101" pitchFamily="2" charset="-122"/>
+                <a:latin typeface="+mn-lt"/>
                 <a:ea typeface="Kaiti SC" panose="02010600040101010101" pitchFamily="2" charset="-122"/>
               </a:defRPr>
             </a:lvl2pPr>
             <a:lvl3pPr>
               <a:defRPr b="0" i="0">
-                <a:latin typeface="Kaiti SC" panose="02010600040101010101" pitchFamily="2" charset="-122"/>
+                <a:latin typeface="+mn-lt"/>
                 <a:ea typeface="Kaiti SC" panose="02010600040101010101" pitchFamily="2" charset="-122"/>
               </a:defRPr>
             </a:lvl3pPr>
             <a:lvl4pPr>
               <a:defRPr b="0" i="0">
-                <a:latin typeface="Kaiti SC" panose="02010600040101010101" pitchFamily="2" charset="-122"/>
+                <a:latin typeface="+mn-lt"/>
                 <a:ea typeface="Kaiti SC" panose="02010600040101010101" pitchFamily="2" charset="-122"/>
               </a:defRPr>
             </a:lvl4pPr>
             <a:lvl5pPr>
               <a:defRPr b="0" i="0">
-                <a:latin typeface="Kaiti SC" panose="02010600040101010101" pitchFamily="2" charset="-122"/>
+                <a:latin typeface="+mn-lt"/>
                 <a:ea typeface="Kaiti SC" panose="02010600040101010101" pitchFamily="2" charset="-122"/>
               </a:defRPr>
             </a:lvl5pPr>

</xml_diff>